<commit_message>
readme de predict topic
</commit_message>
<xml_diff>
--- a/assets/drawings.pptx
+++ b/assets/drawings.pptx
@@ -6,6 +6,7 @@
   </p:sldMasterIdLst>
   <p:sldIdLst>
     <p:sldId id="256" r:id="rId2"/>
+    <p:sldId id="258" r:id="rId3"/>
   </p:sldIdLst>
   <p:sldSz cx="12192000" cy="6858000"/>
   <p:notesSz cx="6858000" cy="9144000"/>
@@ -104,7 +105,248 @@
       </a:defRPr>
     </a:lvl9pPr>
   </p:defaultTextStyle>
+  <p:extLst>
+    <p:ext uri="{EFAFB233-063F-42B5-8137-9DF3F51BA10A}">
+      <p15:sldGuideLst xmlns:p15="http://schemas.microsoft.com/office/powerpoint/2012/main"/>
+    </p:ext>
+  </p:extLst>
 </p:presentation>
+</file>
+
+<file path=ppt/revisionInfo.xml><?xml version="1.0" encoding="utf-8"?>
+<p1510:revInfo xmlns:a="http://schemas.openxmlformats.org/drawingml/2006/main" xmlns:r="http://schemas.openxmlformats.org/officeDocument/2006/relationships" xmlns:p1510="http://schemas.microsoft.com/office/powerpoint/2015/10/main">
+  <p1510:revLst>
+    <p1510:client id="{F5C91CF1-42F3-4479-8BD4-0F30F72FB431}" v="11" dt="2024-07-04T22:32:34.527"/>
+  </p1510:revLst>
+</p1510:revInfo>
+</file>
+
+<file path=ppt/changesInfos/changesInfo1.xml><?xml version="1.0" encoding="utf-8"?>
+<pc:chgInfo xmlns:a="http://schemas.openxmlformats.org/drawingml/2006/main" xmlns:r="http://schemas.openxmlformats.org/officeDocument/2006/relationships" xmlns:ac="http://schemas.microsoft.com/office/drawing/2013/main/command" xmlns:pc="http://schemas.microsoft.com/office/powerpoint/2013/main/command">
+  <pc:docChgLst>
+    <pc:chgData name="Philippe Baucour" userId="5102170ae7533958" providerId="LiveId" clId="{F5C91CF1-42F3-4479-8BD4-0F30F72FB431}"/>
+    <pc:docChg chg="custSel addSld delSld modSld">
+      <pc:chgData name="Philippe Baucour" userId="5102170ae7533958" providerId="LiveId" clId="{F5C91CF1-42F3-4479-8BD4-0F30F72FB431}" dt="2024-07-04T22:33:52.009" v="293" actId="1036"/>
+      <pc:docMkLst>
+        <pc:docMk/>
+      </pc:docMkLst>
+      <pc:sldChg chg="addSp delSp modSp new del mod modClrScheme chgLayout">
+        <pc:chgData name="Philippe Baucour" userId="5102170ae7533958" providerId="LiveId" clId="{F5C91CF1-42F3-4479-8BD4-0F30F72FB431}" dt="2024-07-04T22:20:03.262" v="27" actId="47"/>
+        <pc:sldMkLst>
+          <pc:docMk/>
+          <pc:sldMk cId="2460542152" sldId="257"/>
+        </pc:sldMkLst>
+        <pc:spChg chg="del mod ord">
+          <ac:chgData name="Philippe Baucour" userId="5102170ae7533958" providerId="LiveId" clId="{F5C91CF1-42F3-4479-8BD4-0F30F72FB431}" dt="2024-07-04T22:13:00.301" v="1" actId="700"/>
+          <ac:spMkLst>
+            <pc:docMk/>
+            <pc:sldMk cId="2460542152" sldId="257"/>
+            <ac:spMk id="2" creationId="{51E8C819-E10E-BCED-6068-73578A278B89}"/>
+          </ac:spMkLst>
+        </pc:spChg>
+        <pc:spChg chg="del">
+          <ac:chgData name="Philippe Baucour" userId="5102170ae7533958" providerId="LiveId" clId="{F5C91CF1-42F3-4479-8BD4-0F30F72FB431}" dt="2024-07-04T22:13:00.301" v="1" actId="700"/>
+          <ac:spMkLst>
+            <pc:docMk/>
+            <pc:sldMk cId="2460542152" sldId="257"/>
+            <ac:spMk id="3" creationId="{4D9C90A5-586E-7F24-E2BD-4AAB7527576B}"/>
+          </ac:spMkLst>
+        </pc:spChg>
+        <pc:spChg chg="add mod ord">
+          <ac:chgData name="Philippe Baucour" userId="5102170ae7533958" providerId="LiveId" clId="{F5C91CF1-42F3-4479-8BD4-0F30F72FB431}" dt="2024-07-04T22:13:00.301" v="1" actId="700"/>
+          <ac:spMkLst>
+            <pc:docMk/>
+            <pc:sldMk cId="2460542152" sldId="257"/>
+            <ac:spMk id="4" creationId="{887DE8E7-676B-250E-0B23-C2FF780C6C31}"/>
+          </ac:spMkLst>
+        </pc:spChg>
+      </pc:sldChg>
+      <pc:sldChg chg="addSp delSp modSp new mod">
+        <pc:chgData name="Philippe Baucour" userId="5102170ae7533958" providerId="LiveId" clId="{F5C91CF1-42F3-4479-8BD4-0F30F72FB431}" dt="2024-07-04T22:33:52.009" v="293" actId="1036"/>
+        <pc:sldMkLst>
+          <pc:docMk/>
+          <pc:sldMk cId="655326077" sldId="258"/>
+        </pc:sldMkLst>
+        <pc:spChg chg="add mod">
+          <ac:chgData name="Philippe Baucour" userId="5102170ae7533958" providerId="LiveId" clId="{F5C91CF1-42F3-4479-8BD4-0F30F72FB431}" dt="2024-07-04T22:21:22.101" v="37" actId="1076"/>
+          <ac:spMkLst>
+            <pc:docMk/>
+            <pc:sldMk cId="655326077" sldId="258"/>
+            <ac:spMk id="4" creationId="{F2BF3D44-7489-D86E-F92A-72019F762E73}"/>
+          </ac:spMkLst>
+        </pc:spChg>
+        <pc:spChg chg="add mod ord">
+          <ac:chgData name="Philippe Baucour" userId="5102170ae7533958" providerId="LiveId" clId="{F5C91CF1-42F3-4479-8BD4-0F30F72FB431}" dt="2024-07-04T22:26:07.762" v="64" actId="167"/>
+          <ac:spMkLst>
+            <pc:docMk/>
+            <pc:sldMk cId="655326077" sldId="258"/>
+            <ac:spMk id="5" creationId="{4C0B12C1-EB00-388D-85B0-5D99890703EE}"/>
+          </ac:spMkLst>
+        </pc:spChg>
+        <pc:spChg chg="add mod">
+          <ac:chgData name="Philippe Baucour" userId="5102170ae7533958" providerId="LiveId" clId="{F5C91CF1-42F3-4479-8BD4-0F30F72FB431}" dt="2024-07-04T22:21:56.543" v="43" actId="571"/>
+          <ac:spMkLst>
+            <pc:docMk/>
+            <pc:sldMk cId="655326077" sldId="258"/>
+            <ac:spMk id="14" creationId="{2C5A99A5-569E-7077-CB59-1BFFEB0E1B41}"/>
+          </ac:spMkLst>
+        </pc:spChg>
+        <pc:spChg chg="add mod">
+          <ac:chgData name="Philippe Baucour" userId="5102170ae7533958" providerId="LiveId" clId="{F5C91CF1-42F3-4479-8BD4-0F30F72FB431}" dt="2024-07-04T22:28:11.807" v="103" actId="1076"/>
+          <ac:spMkLst>
+            <pc:docMk/>
+            <pc:sldMk cId="655326077" sldId="258"/>
+            <ac:spMk id="39" creationId="{AA657646-6134-7516-6765-A95D84029C18}"/>
+          </ac:spMkLst>
+        </pc:spChg>
+        <pc:spChg chg="add mod">
+          <ac:chgData name="Philippe Baucour" userId="5102170ae7533958" providerId="LiveId" clId="{F5C91CF1-42F3-4479-8BD4-0F30F72FB431}" dt="2024-07-04T22:28:23.887" v="106" actId="20577"/>
+          <ac:spMkLst>
+            <pc:docMk/>
+            <pc:sldMk cId="655326077" sldId="258"/>
+            <ac:spMk id="40" creationId="{6E18830C-A06B-2E59-3155-E21C8F882574}"/>
+          </ac:spMkLst>
+        </pc:spChg>
+        <pc:spChg chg="add mod">
+          <ac:chgData name="Philippe Baucour" userId="5102170ae7533958" providerId="LiveId" clId="{F5C91CF1-42F3-4479-8BD4-0F30F72FB431}" dt="2024-07-04T22:31:26.807" v="152" actId="1037"/>
+          <ac:spMkLst>
+            <pc:docMk/>
+            <pc:sldMk cId="655326077" sldId="258"/>
+            <ac:spMk id="41" creationId="{5F1CCAD6-FC64-5830-AAF7-564B7C6A54BC}"/>
+          </ac:spMkLst>
+        </pc:spChg>
+        <pc:spChg chg="add mod">
+          <ac:chgData name="Philippe Baucour" userId="5102170ae7533958" providerId="LiveId" clId="{F5C91CF1-42F3-4479-8BD4-0F30F72FB431}" dt="2024-07-04T22:31:58.713" v="178" actId="1036"/>
+          <ac:spMkLst>
+            <pc:docMk/>
+            <pc:sldMk cId="655326077" sldId="258"/>
+            <ac:spMk id="42" creationId="{5C360675-8566-28CD-6662-E5FDD6B6C8C3}"/>
+          </ac:spMkLst>
+        </pc:spChg>
+        <pc:spChg chg="add mod">
+          <ac:chgData name="Philippe Baucour" userId="5102170ae7533958" providerId="LiveId" clId="{F5C91CF1-42F3-4479-8BD4-0F30F72FB431}" dt="2024-07-04T22:33:52.009" v="293" actId="1036"/>
+          <ac:spMkLst>
+            <pc:docMk/>
+            <pc:sldMk cId="655326077" sldId="258"/>
+            <ac:spMk id="43" creationId="{329BDCA3-BF29-61A6-09FA-C58EA1D22BB1}"/>
+          </ac:spMkLst>
+        </pc:spChg>
+        <pc:spChg chg="add mod">
+          <ac:chgData name="Philippe Baucour" userId="5102170ae7533958" providerId="LiveId" clId="{F5C91CF1-42F3-4479-8BD4-0F30F72FB431}" dt="2024-07-04T22:33:52.009" v="293" actId="1036"/>
+          <ac:spMkLst>
+            <pc:docMk/>
+            <pc:sldMk cId="655326077" sldId="258"/>
+            <ac:spMk id="44" creationId="{FD1DC89B-83F3-EB3F-59DB-781D1932EDB9}"/>
+          </ac:spMkLst>
+        </pc:spChg>
+        <pc:picChg chg="add del mod">
+          <ac:chgData name="Philippe Baucour" userId="5102170ae7533958" providerId="LiveId" clId="{F5C91CF1-42F3-4479-8BD4-0F30F72FB431}" dt="2024-07-04T22:19:38.594" v="25" actId="478"/>
+          <ac:picMkLst>
+            <pc:docMk/>
+            <pc:sldMk cId="655326077" sldId="258"/>
+            <ac:picMk id="3" creationId="{82354E1F-26E6-DFE0-322E-AFD6509E6625}"/>
+          </ac:picMkLst>
+        </pc:picChg>
+        <pc:picChg chg="add mod">
+          <ac:chgData name="Philippe Baucour" userId="5102170ae7533958" providerId="LiveId" clId="{F5C91CF1-42F3-4479-8BD4-0F30F72FB431}" dt="2024-07-04T22:21:31.406" v="39" actId="1076"/>
+          <ac:picMkLst>
+            <pc:docMk/>
+            <pc:sldMk cId="655326077" sldId="258"/>
+            <ac:picMk id="7" creationId="{08D08A52-862E-7411-004A-ABEAE6CF0F5E}"/>
+          </ac:picMkLst>
+        </pc:picChg>
+        <pc:picChg chg="add mod">
+          <ac:chgData name="Philippe Baucour" userId="5102170ae7533958" providerId="LiveId" clId="{F5C91CF1-42F3-4479-8BD4-0F30F72FB431}" dt="2024-07-04T22:26:19.329" v="86" actId="1036"/>
+          <ac:picMkLst>
+            <pc:docMk/>
+            <pc:sldMk cId="655326077" sldId="258"/>
+            <ac:picMk id="9" creationId="{D0DF13A7-9F90-348C-5A37-07AA701B38E2}"/>
+          </ac:picMkLst>
+        </pc:picChg>
+        <pc:picChg chg="add mod">
+          <ac:chgData name="Philippe Baucour" userId="5102170ae7533958" providerId="LiveId" clId="{F5C91CF1-42F3-4479-8BD4-0F30F72FB431}" dt="2024-07-04T22:21:22.101" v="37" actId="1076"/>
+          <ac:picMkLst>
+            <pc:docMk/>
+            <pc:sldMk cId="655326077" sldId="258"/>
+            <ac:picMk id="11" creationId="{2890084B-FED6-48AC-2CDA-1AF68992C054}"/>
+          </ac:picMkLst>
+        </pc:picChg>
+        <pc:picChg chg="add mod">
+          <ac:chgData name="Philippe Baucour" userId="5102170ae7533958" providerId="LiveId" clId="{F5C91CF1-42F3-4479-8BD4-0F30F72FB431}" dt="2024-07-04T22:21:34.543" v="40" actId="1076"/>
+          <ac:picMkLst>
+            <pc:docMk/>
+            <pc:sldMk cId="655326077" sldId="258"/>
+            <ac:picMk id="13" creationId="{0D627424-D20D-F17B-282A-2022746C79D6}"/>
+          </ac:picMkLst>
+        </pc:picChg>
+        <pc:picChg chg="add mod">
+          <ac:chgData name="Philippe Baucour" userId="5102170ae7533958" providerId="LiveId" clId="{F5C91CF1-42F3-4479-8BD4-0F30F72FB431}" dt="2024-07-04T22:21:56.543" v="43" actId="571"/>
+          <ac:picMkLst>
+            <pc:docMk/>
+            <pc:sldMk cId="655326077" sldId="258"/>
+            <ac:picMk id="15" creationId="{172AE198-99CB-2945-BB4B-AEB57A99FF0C}"/>
+          </ac:picMkLst>
+        </pc:picChg>
+        <pc:picChg chg="add mod">
+          <ac:chgData name="Philippe Baucour" userId="5102170ae7533958" providerId="LiveId" clId="{F5C91CF1-42F3-4479-8BD4-0F30F72FB431}" dt="2024-07-04T22:23:06.884" v="49" actId="1076"/>
+          <ac:picMkLst>
+            <pc:docMk/>
+            <pc:sldMk cId="655326077" sldId="258"/>
+            <ac:picMk id="16" creationId="{F89097A5-3953-3397-1C06-5359B5D85F2D}"/>
+          </ac:picMkLst>
+        </pc:picChg>
+        <pc:picChg chg="add mod">
+          <ac:chgData name="Philippe Baucour" userId="5102170ae7533958" providerId="LiveId" clId="{F5C91CF1-42F3-4479-8BD4-0F30F72FB431}" dt="2024-07-04T22:27:26.511" v="92" actId="14100"/>
+          <ac:picMkLst>
+            <pc:docMk/>
+            <pc:sldMk cId="655326077" sldId="258"/>
+            <ac:picMk id="36" creationId="{C0E88518-4FFA-7811-42C6-2A0B4B8CE1FA}"/>
+          </ac:picMkLst>
+        </pc:picChg>
+        <pc:cxnChg chg="add mod">
+          <ac:chgData name="Philippe Baucour" userId="5102170ae7533958" providerId="LiveId" clId="{F5C91CF1-42F3-4479-8BD4-0F30F72FB431}" dt="2024-07-04T22:23:31.777" v="51" actId="14100"/>
+          <ac:cxnSpMkLst>
+            <pc:docMk/>
+            <pc:sldMk cId="655326077" sldId="258"/>
+            <ac:cxnSpMk id="18" creationId="{D7E0B5D7-E25E-36FB-9CB5-0955B90E2D63}"/>
+          </ac:cxnSpMkLst>
+        </pc:cxnChg>
+        <pc:cxnChg chg="add mod">
+          <ac:chgData name="Philippe Baucour" userId="5102170ae7533958" providerId="LiveId" clId="{F5C91CF1-42F3-4479-8BD4-0F30F72FB431}" dt="2024-07-04T22:23:56.460" v="53" actId="14100"/>
+          <ac:cxnSpMkLst>
+            <pc:docMk/>
+            <pc:sldMk cId="655326077" sldId="258"/>
+            <ac:cxnSpMk id="21" creationId="{63E4AE85-6D80-BCF0-1132-D33693D918BB}"/>
+          </ac:cxnSpMkLst>
+        </pc:cxnChg>
+        <pc:cxnChg chg="add mod">
+          <ac:chgData name="Philippe Baucour" userId="5102170ae7533958" providerId="LiveId" clId="{F5C91CF1-42F3-4479-8BD4-0F30F72FB431}" dt="2024-07-04T22:24:22.416" v="55" actId="14100"/>
+          <ac:cxnSpMkLst>
+            <pc:docMk/>
+            <pc:sldMk cId="655326077" sldId="258"/>
+            <ac:cxnSpMk id="24" creationId="{663E7747-1761-E217-799F-E019D1D16E1B}"/>
+          </ac:cxnSpMkLst>
+        </pc:cxnChg>
+        <pc:cxnChg chg="add mod">
+          <ac:chgData name="Philippe Baucour" userId="5102170ae7533958" providerId="LiveId" clId="{F5C91CF1-42F3-4479-8BD4-0F30F72FB431}" dt="2024-07-04T22:27:13.665" v="90" actId="14100"/>
+          <ac:cxnSpMkLst>
+            <pc:docMk/>
+            <pc:sldMk cId="655326077" sldId="258"/>
+            <ac:cxnSpMk id="27" creationId="{CC5B5B29-A61F-080D-1E1C-F056635D3546}"/>
+          </ac:cxnSpMkLst>
+        </pc:cxnChg>
+        <pc:cxnChg chg="add">
+          <ac:chgData name="Philippe Baucour" userId="5102170ae7533958" providerId="LiveId" clId="{F5C91CF1-42F3-4479-8BD4-0F30F72FB431}" dt="2024-07-04T22:25:27.562" v="61" actId="11529"/>
+          <ac:cxnSpMkLst>
+            <pc:docMk/>
+            <pc:sldMk cId="655326077" sldId="258"/>
+            <ac:cxnSpMk id="32" creationId="{7E37BB66-D7E7-5D68-8C7D-B3F37CB60C8E}"/>
+          </ac:cxnSpMkLst>
+        </pc:cxnChg>
+      </pc:sldChg>
+    </pc:docChg>
+  </pc:docChgLst>
+</pc:chgInfo>
 </file>
 
 <file path=ppt/slideLayouts/slideLayout1.xml><?xml version="1.0" encoding="utf-8"?>
@@ -254,7 +496,7 @@
           <a:p>
             <a:fld id="{48780376-FC85-460A-8725-EC72919AD33D}" type="datetimeFigureOut">
               <a:rPr lang="fr-FR" smtClean="0"/>
-              <a:t>03/07/2024</a:t>
+              <a:t>05/07/2024</a:t>
             </a:fld>
             <a:endParaRPr lang="fr-FR"/>
           </a:p>
@@ -452,7 +694,7 @@
           <a:p>
             <a:fld id="{48780376-FC85-460A-8725-EC72919AD33D}" type="datetimeFigureOut">
               <a:rPr lang="fr-FR" smtClean="0"/>
-              <a:t>03/07/2024</a:t>
+              <a:t>05/07/2024</a:t>
             </a:fld>
             <a:endParaRPr lang="fr-FR"/>
           </a:p>
@@ -660,7 +902,7 @@
           <a:p>
             <a:fld id="{48780376-FC85-460A-8725-EC72919AD33D}" type="datetimeFigureOut">
               <a:rPr lang="fr-FR" smtClean="0"/>
-              <a:t>03/07/2024</a:t>
+              <a:t>05/07/2024</a:t>
             </a:fld>
             <a:endParaRPr lang="fr-FR"/>
           </a:p>
@@ -858,7 +1100,7 @@
           <a:p>
             <a:fld id="{48780376-FC85-460A-8725-EC72919AD33D}" type="datetimeFigureOut">
               <a:rPr lang="fr-FR" smtClean="0"/>
-              <a:t>03/07/2024</a:t>
+              <a:t>05/07/2024</a:t>
             </a:fld>
             <a:endParaRPr lang="fr-FR"/>
           </a:p>
@@ -1133,7 +1375,7 @@
           <a:p>
             <a:fld id="{48780376-FC85-460A-8725-EC72919AD33D}" type="datetimeFigureOut">
               <a:rPr lang="fr-FR" smtClean="0"/>
-              <a:t>03/07/2024</a:t>
+              <a:t>05/07/2024</a:t>
             </a:fld>
             <a:endParaRPr lang="fr-FR"/>
           </a:p>
@@ -1398,7 +1640,7 @@
           <a:p>
             <a:fld id="{48780376-FC85-460A-8725-EC72919AD33D}" type="datetimeFigureOut">
               <a:rPr lang="fr-FR" smtClean="0"/>
-              <a:t>03/07/2024</a:t>
+              <a:t>05/07/2024</a:t>
             </a:fld>
             <a:endParaRPr lang="fr-FR"/>
           </a:p>
@@ -1810,7 +2052,7 @@
           <a:p>
             <a:fld id="{48780376-FC85-460A-8725-EC72919AD33D}" type="datetimeFigureOut">
               <a:rPr lang="fr-FR" smtClean="0"/>
-              <a:t>03/07/2024</a:t>
+              <a:t>05/07/2024</a:t>
             </a:fld>
             <a:endParaRPr lang="fr-FR"/>
           </a:p>
@@ -1951,7 +2193,7 @@
           <a:p>
             <a:fld id="{48780376-FC85-460A-8725-EC72919AD33D}" type="datetimeFigureOut">
               <a:rPr lang="fr-FR" smtClean="0"/>
-              <a:t>03/07/2024</a:t>
+              <a:t>05/07/2024</a:t>
             </a:fld>
             <a:endParaRPr lang="fr-FR"/>
           </a:p>
@@ -2064,7 +2306,7 @@
           <a:p>
             <a:fld id="{48780376-FC85-460A-8725-EC72919AD33D}" type="datetimeFigureOut">
               <a:rPr lang="fr-FR" smtClean="0"/>
-              <a:t>03/07/2024</a:t>
+              <a:t>05/07/2024</a:t>
             </a:fld>
             <a:endParaRPr lang="fr-FR"/>
           </a:p>
@@ -2375,7 +2617,7 @@
           <a:p>
             <a:fld id="{48780376-FC85-460A-8725-EC72919AD33D}" type="datetimeFigureOut">
               <a:rPr lang="fr-FR" smtClean="0"/>
-              <a:t>03/07/2024</a:t>
+              <a:t>05/07/2024</a:t>
             </a:fld>
             <a:endParaRPr lang="fr-FR"/>
           </a:p>
@@ -2663,7 +2905,7 @@
           <a:p>
             <a:fld id="{48780376-FC85-460A-8725-EC72919AD33D}" type="datetimeFigureOut">
               <a:rPr lang="fr-FR" smtClean="0"/>
-              <a:t>03/07/2024</a:t>
+              <a:t>05/07/2024</a:t>
             </a:fld>
             <a:endParaRPr lang="fr-FR"/>
           </a:p>
@@ -2904,7 +3146,7 @@
           <a:p>
             <a:fld id="{48780376-FC85-460A-8725-EC72919AD33D}" type="datetimeFigureOut">
               <a:rPr lang="fr-FR" smtClean="0"/>
-              <a:t>03/07/2024</a:t>
+              <a:t>05/07/2024</a:t>
             </a:fld>
             <a:endParaRPr lang="fr-FR"/>
           </a:p>
@@ -3610,6 +3852,806 @@
     <p:extLst>
       <p:ext uri="{BB962C8B-B14F-4D97-AF65-F5344CB8AC3E}">
         <p14:creationId xmlns:p14="http://schemas.microsoft.com/office/powerpoint/2010/main" val="2365695644"/>
+      </p:ext>
+    </p:extLst>
+  </p:cSld>
+  <p:clrMapOvr>
+    <a:masterClrMapping/>
+  </p:clrMapOvr>
+</p:sld>
+</file>
+
+<file path=ppt/slides/slide2.xml><?xml version="1.0" encoding="utf-8"?>
+<p:sld xmlns:a="http://schemas.openxmlformats.org/drawingml/2006/main" xmlns:r="http://schemas.openxmlformats.org/officeDocument/2006/relationships" xmlns:p="http://schemas.openxmlformats.org/presentationml/2006/main">
+  <p:cSld>
+    <p:spTree>
+      <p:nvGrpSpPr>
+        <p:cNvPr id="1" name=""/>
+        <p:cNvGrpSpPr/>
+        <p:nvPr/>
+      </p:nvGrpSpPr>
+      <p:grpSpPr>
+        <a:xfrm>
+          <a:off x="0" y="0"/>
+          <a:ext cx="0" cy="0"/>
+          <a:chOff x="0" y="0"/>
+          <a:chExt cx="0" cy="0"/>
+        </a:xfrm>
+      </p:grpSpPr>
+      <p:sp>
+        <p:nvSpPr>
+          <p:cNvPr id="5" name="Rectangle 4">
+            <a:extLst>
+              <a:ext uri="{FF2B5EF4-FFF2-40B4-BE49-F238E27FC236}">
+                <a16:creationId xmlns:a16="http://schemas.microsoft.com/office/drawing/2014/main" id="{4C0B12C1-EB00-388D-85B0-5D99890703EE}"/>
+              </a:ext>
+            </a:extLst>
+          </p:cNvPr>
+          <p:cNvSpPr/>
+          <p:nvPr/>
+        </p:nvSpPr>
+        <p:spPr>
+          <a:xfrm>
+            <a:off x="2536305" y="1688422"/>
+            <a:ext cx="8125719" cy="3224237"/>
+          </a:xfrm>
+          <a:prstGeom prst="rect">
+            <a:avLst/>
+          </a:prstGeom>
+          <a:solidFill>
+            <a:srgbClr val="FFF5D9"/>
+          </a:solidFill>
+          <a:ln>
+            <a:noFill/>
+          </a:ln>
+        </p:spPr>
+        <p:style>
+          <a:lnRef idx="2">
+            <a:schemeClr val="accent1">
+              <a:shade val="15000"/>
+            </a:schemeClr>
+          </a:lnRef>
+          <a:fillRef idx="1">
+            <a:schemeClr val="accent1"/>
+          </a:fillRef>
+          <a:effectRef idx="0">
+            <a:schemeClr val="accent1"/>
+          </a:effectRef>
+          <a:fontRef idx="minor">
+            <a:schemeClr val="lt1"/>
+          </a:fontRef>
+        </p:style>
+        <p:txBody>
+          <a:bodyPr rtlCol="0" anchor="ctr"/>
+          <a:lstStyle/>
+          <a:p>
+            <a:pPr algn="ctr"/>
+            <a:endParaRPr lang="fr-FR"/>
+          </a:p>
+        </p:txBody>
+      </p:sp>
+      <p:sp>
+        <p:nvSpPr>
+          <p:cNvPr id="4" name="Rectangle 3">
+            <a:extLst>
+              <a:ext uri="{FF2B5EF4-FFF2-40B4-BE49-F238E27FC236}">
+                <a16:creationId xmlns:a16="http://schemas.microsoft.com/office/drawing/2014/main" id="{F2BF3D44-7489-D86E-F92A-72019F762E73}"/>
+              </a:ext>
+            </a:extLst>
+          </p:cNvPr>
+          <p:cNvSpPr/>
+          <p:nvPr/>
+        </p:nvSpPr>
+        <p:spPr>
+          <a:xfrm>
+            <a:off x="219716" y="1688421"/>
+            <a:ext cx="1736871" cy="3224237"/>
+          </a:xfrm>
+          <a:prstGeom prst="rect">
+            <a:avLst/>
+          </a:prstGeom>
+          <a:solidFill>
+            <a:srgbClr val="E6FFED"/>
+          </a:solidFill>
+          <a:ln>
+            <a:noFill/>
+          </a:ln>
+        </p:spPr>
+        <p:style>
+          <a:lnRef idx="2">
+            <a:schemeClr val="accent1">
+              <a:shade val="15000"/>
+            </a:schemeClr>
+          </a:lnRef>
+          <a:fillRef idx="1">
+            <a:schemeClr val="accent1"/>
+          </a:fillRef>
+          <a:effectRef idx="0">
+            <a:schemeClr val="accent1"/>
+          </a:effectRef>
+          <a:fontRef idx="minor">
+            <a:schemeClr val="lt1"/>
+          </a:fontRef>
+        </p:style>
+        <p:txBody>
+          <a:bodyPr rtlCol="0" anchor="ctr"/>
+          <a:lstStyle/>
+          <a:p>
+            <a:pPr algn="ctr"/>
+            <a:endParaRPr lang="fr-FR"/>
+          </a:p>
+        </p:txBody>
+      </p:sp>
+      <p:pic>
+        <p:nvPicPr>
+          <p:cNvPr id="7" name="Image 6">
+            <a:extLst>
+              <a:ext uri="{FF2B5EF4-FFF2-40B4-BE49-F238E27FC236}">
+                <a16:creationId xmlns:a16="http://schemas.microsoft.com/office/drawing/2014/main" id="{08D08A52-862E-7411-004A-ABEAE6CF0F5E}"/>
+              </a:ext>
+            </a:extLst>
+          </p:cNvPr>
+          <p:cNvPicPr>
+            <a:picLocks noChangeAspect="1"/>
+          </p:cNvPicPr>
+          <p:nvPr/>
+        </p:nvPicPr>
+        <p:blipFill>
+          <a:blip r:embed="rId2"/>
+          <a:stretch>
+            <a:fillRect/>
+          </a:stretch>
+        </p:blipFill>
+        <p:spPr>
+          <a:xfrm>
+            <a:off x="10927728" y="2615410"/>
+            <a:ext cx="1150719" cy="880186"/>
+          </a:xfrm>
+          <a:prstGeom prst="rect">
+            <a:avLst/>
+          </a:prstGeom>
+        </p:spPr>
+      </p:pic>
+      <p:pic>
+        <p:nvPicPr>
+          <p:cNvPr id="9" name="Graphique 8" descr="Base de données contour">
+            <a:extLst>
+              <a:ext uri="{FF2B5EF4-FFF2-40B4-BE49-F238E27FC236}">
+                <a16:creationId xmlns:a16="http://schemas.microsoft.com/office/drawing/2014/main" id="{D0DF13A7-9F90-348C-5A37-07AA701B38E2}"/>
+              </a:ext>
+            </a:extLst>
+          </p:cNvPr>
+          <p:cNvPicPr>
+            <a:picLocks noChangeAspect="1"/>
+          </p:cNvPicPr>
+          <p:nvPr/>
+        </p:nvPicPr>
+        <p:blipFill>
+          <a:blip r:embed="rId3">
+            <a:extLst>
+              <a:ext uri="{96DAC541-7B7A-43D3-8B79-37D633B846F1}">
+                <asvg:svgBlip xmlns:asvg="http://schemas.microsoft.com/office/drawing/2016/SVG/main" r:embed="rId4"/>
+              </a:ext>
+            </a:extLst>
+          </a:blip>
+          <a:stretch>
+            <a:fillRect/>
+          </a:stretch>
+        </p:blipFill>
+        <p:spPr>
+          <a:xfrm>
+            <a:off x="8397061" y="3288347"/>
+            <a:ext cx="914400" cy="914400"/>
+          </a:xfrm>
+          <a:prstGeom prst="rect">
+            <a:avLst/>
+          </a:prstGeom>
+        </p:spPr>
+      </p:pic>
+      <p:pic>
+        <p:nvPicPr>
+          <p:cNvPr id="11" name="Image 10">
+            <a:extLst>
+              <a:ext uri="{FF2B5EF4-FFF2-40B4-BE49-F238E27FC236}">
+                <a16:creationId xmlns:a16="http://schemas.microsoft.com/office/drawing/2014/main" id="{2890084B-FED6-48AC-2CDA-1AF68992C054}"/>
+              </a:ext>
+            </a:extLst>
+          </p:cNvPr>
+          <p:cNvPicPr>
+            <a:picLocks noChangeAspect="1"/>
+          </p:cNvPicPr>
+          <p:nvPr/>
+        </p:nvPicPr>
+        <p:blipFill>
+          <a:blip r:embed="rId5"/>
+          <a:stretch>
+            <a:fillRect/>
+          </a:stretch>
+        </p:blipFill>
+        <p:spPr>
+          <a:xfrm>
+            <a:off x="306369" y="1757707"/>
+            <a:ext cx="1189697" cy="436956"/>
+          </a:xfrm>
+          <a:prstGeom prst="rect">
+            <a:avLst/>
+          </a:prstGeom>
+        </p:spPr>
+      </p:pic>
+      <p:pic>
+        <p:nvPicPr>
+          <p:cNvPr id="13" name="Image 12">
+            <a:extLst>
+              <a:ext uri="{FF2B5EF4-FFF2-40B4-BE49-F238E27FC236}">
+                <a16:creationId xmlns:a16="http://schemas.microsoft.com/office/drawing/2014/main" id="{0D627424-D20D-F17B-282A-2022746C79D6}"/>
+              </a:ext>
+            </a:extLst>
+          </p:cNvPr>
+          <p:cNvPicPr>
+            <a:picLocks noChangeAspect="1"/>
+          </p:cNvPicPr>
+          <p:nvPr/>
+        </p:nvPicPr>
+        <p:blipFill>
+          <a:blip r:embed="rId6"/>
+          <a:stretch>
+            <a:fillRect/>
+          </a:stretch>
+        </p:blipFill>
+        <p:spPr>
+          <a:xfrm>
+            <a:off x="9991724" y="1757707"/>
+            <a:ext cx="535435" cy="720778"/>
+          </a:xfrm>
+          <a:prstGeom prst="rect">
+            <a:avLst/>
+          </a:prstGeom>
+        </p:spPr>
+      </p:pic>
+      <p:pic>
+        <p:nvPicPr>
+          <p:cNvPr id="16" name="Graphique 15" descr="Base de données contour">
+            <a:extLst>
+              <a:ext uri="{FF2B5EF4-FFF2-40B4-BE49-F238E27FC236}">
+                <a16:creationId xmlns:a16="http://schemas.microsoft.com/office/drawing/2014/main" id="{F89097A5-3953-3397-1C06-5359B5D85F2D}"/>
+              </a:ext>
+            </a:extLst>
+          </p:cNvPr>
+          <p:cNvPicPr>
+            <a:picLocks noChangeAspect="1"/>
+          </p:cNvPicPr>
+          <p:nvPr/>
+        </p:nvPicPr>
+        <p:blipFill>
+          <a:blip r:embed="rId7">
+            <a:extLst>
+              <a:ext uri="{96DAC541-7B7A-43D3-8B79-37D633B846F1}">
+                <asvg:svgBlip xmlns:asvg="http://schemas.microsoft.com/office/drawing/2016/SVG/main" r:embed="rId8"/>
+              </a:ext>
+            </a:extLst>
+          </a:blip>
+          <a:stretch>
+            <a:fillRect/>
+          </a:stretch>
+        </p:blipFill>
+        <p:spPr>
+          <a:xfrm>
+            <a:off x="3597239" y="3300539"/>
+            <a:ext cx="914400" cy="914400"/>
+          </a:xfrm>
+          <a:prstGeom prst="rect">
+            <a:avLst/>
+          </a:prstGeom>
+        </p:spPr>
+      </p:pic>
+      <p:cxnSp>
+        <p:nvCxnSpPr>
+          <p:cNvPr id="18" name="Connecteur : en angle 17">
+            <a:extLst>
+              <a:ext uri="{FF2B5EF4-FFF2-40B4-BE49-F238E27FC236}">
+                <a16:creationId xmlns:a16="http://schemas.microsoft.com/office/drawing/2014/main" id="{D7E0B5D7-E25E-36FB-9CB5-0955B90E2D63}"/>
+              </a:ext>
+            </a:extLst>
+          </p:cNvPr>
+          <p:cNvCxnSpPr>
+            <a:stCxn id="7" idx="1"/>
+          </p:cNvCxnSpPr>
+          <p:nvPr/>
+        </p:nvCxnSpPr>
+        <p:spPr>
+          <a:xfrm rot="10800000" flipV="1">
+            <a:off x="8970086" y="3055502"/>
+            <a:ext cx="1957643" cy="291321"/>
+          </a:xfrm>
+          <a:prstGeom prst="bentConnector3">
+            <a:avLst>
+              <a:gd name="adj1" fmla="val 100373"/>
+            </a:avLst>
+          </a:prstGeom>
+          <a:ln>
+            <a:tailEnd type="triangle"/>
+          </a:ln>
+        </p:spPr>
+        <p:style>
+          <a:lnRef idx="2">
+            <a:schemeClr val="accent1"/>
+          </a:lnRef>
+          <a:fillRef idx="0">
+            <a:schemeClr val="accent1"/>
+          </a:fillRef>
+          <a:effectRef idx="1">
+            <a:schemeClr val="accent1"/>
+          </a:effectRef>
+          <a:fontRef idx="minor">
+            <a:schemeClr val="tx1"/>
+          </a:fontRef>
+        </p:style>
+      </p:cxnSp>
+      <p:cxnSp>
+        <p:nvCxnSpPr>
+          <p:cNvPr id="21" name="Connecteur : en angle 20">
+            <a:extLst>
+              <a:ext uri="{FF2B5EF4-FFF2-40B4-BE49-F238E27FC236}">
+                <a16:creationId xmlns:a16="http://schemas.microsoft.com/office/drawing/2014/main" id="{63E4AE85-6D80-BCF0-1132-D33693D918BB}"/>
+              </a:ext>
+            </a:extLst>
+          </p:cNvPr>
+          <p:cNvCxnSpPr/>
+          <p:nvPr/>
+        </p:nvCxnSpPr>
+        <p:spPr>
+          <a:xfrm rot="10800000">
+            <a:off x="1715248" y="2194663"/>
+            <a:ext cx="7052235" cy="1105876"/>
+          </a:xfrm>
+          <a:prstGeom prst="bentConnector3">
+            <a:avLst>
+              <a:gd name="adj1" fmla="val 0"/>
+            </a:avLst>
+          </a:prstGeom>
+          <a:ln>
+            <a:tailEnd type="triangle"/>
+          </a:ln>
+        </p:spPr>
+        <p:style>
+          <a:lnRef idx="2">
+            <a:schemeClr val="accent1"/>
+          </a:lnRef>
+          <a:fillRef idx="0">
+            <a:schemeClr val="accent1"/>
+          </a:fillRef>
+          <a:effectRef idx="1">
+            <a:schemeClr val="accent1"/>
+          </a:effectRef>
+          <a:fontRef idx="minor">
+            <a:schemeClr val="tx1"/>
+          </a:fontRef>
+        </p:style>
+      </p:cxnSp>
+      <p:cxnSp>
+        <p:nvCxnSpPr>
+          <p:cNvPr id="24" name="Connecteur : en angle 23">
+            <a:extLst>
+              <a:ext uri="{FF2B5EF4-FFF2-40B4-BE49-F238E27FC236}">
+                <a16:creationId xmlns:a16="http://schemas.microsoft.com/office/drawing/2014/main" id="{663E7747-1761-E217-799F-E019D1D16E1B}"/>
+              </a:ext>
+            </a:extLst>
+          </p:cNvPr>
+          <p:cNvCxnSpPr/>
+          <p:nvPr/>
+        </p:nvCxnSpPr>
+        <p:spPr>
+          <a:xfrm>
+            <a:off x="1716259" y="2808941"/>
+            <a:ext cx="2240165" cy="537882"/>
+          </a:xfrm>
+          <a:prstGeom prst="bentConnector3">
+            <a:avLst>
+              <a:gd name="adj1" fmla="val 99889"/>
+            </a:avLst>
+          </a:prstGeom>
+          <a:ln>
+            <a:tailEnd type="triangle"/>
+          </a:ln>
+        </p:spPr>
+        <p:style>
+          <a:lnRef idx="2">
+            <a:schemeClr val="accent1"/>
+          </a:lnRef>
+          <a:fillRef idx="0">
+            <a:schemeClr val="accent1"/>
+          </a:fillRef>
+          <a:effectRef idx="1">
+            <a:schemeClr val="accent1"/>
+          </a:effectRef>
+          <a:fontRef idx="minor">
+            <a:schemeClr val="tx1"/>
+          </a:fontRef>
+        </p:style>
+      </p:cxnSp>
+      <p:cxnSp>
+        <p:nvCxnSpPr>
+          <p:cNvPr id="27" name="Connecteur : en angle 26">
+            <a:extLst>
+              <a:ext uri="{FF2B5EF4-FFF2-40B4-BE49-F238E27FC236}">
+                <a16:creationId xmlns:a16="http://schemas.microsoft.com/office/drawing/2014/main" id="{CC5B5B29-A61F-080D-1E1C-F056635D3546}"/>
+              </a:ext>
+            </a:extLst>
+          </p:cNvPr>
+          <p:cNvCxnSpPr>
+            <a:cxnSpLocks/>
+          </p:cNvCxnSpPr>
+          <p:nvPr/>
+        </p:nvCxnSpPr>
+        <p:spPr>
+          <a:xfrm>
+            <a:off x="4222129" y="2808943"/>
+            <a:ext cx="2607479" cy="2427521"/>
+          </a:xfrm>
+          <a:prstGeom prst="bentConnector3">
+            <a:avLst>
+              <a:gd name="adj1" fmla="val 100031"/>
+            </a:avLst>
+          </a:prstGeom>
+          <a:ln>
+            <a:tailEnd type="triangle"/>
+          </a:ln>
+        </p:spPr>
+        <p:style>
+          <a:lnRef idx="2">
+            <a:schemeClr val="accent1"/>
+          </a:lnRef>
+          <a:fillRef idx="0">
+            <a:schemeClr val="accent1"/>
+          </a:fillRef>
+          <a:effectRef idx="1">
+            <a:schemeClr val="accent1"/>
+          </a:effectRef>
+          <a:fontRef idx="minor">
+            <a:schemeClr val="tx1"/>
+          </a:fontRef>
+        </p:style>
+      </p:cxnSp>
+      <p:cxnSp>
+        <p:nvCxnSpPr>
+          <p:cNvPr id="32" name="Connecteur droit 31">
+            <a:extLst>
+              <a:ext uri="{FF2B5EF4-FFF2-40B4-BE49-F238E27FC236}">
+                <a16:creationId xmlns:a16="http://schemas.microsoft.com/office/drawing/2014/main" id="{7E37BB66-D7E7-5D68-8C7D-B3F37CB60C8E}"/>
+              </a:ext>
+            </a:extLst>
+          </p:cNvPr>
+          <p:cNvCxnSpPr/>
+          <p:nvPr/>
+        </p:nvCxnSpPr>
+        <p:spPr>
+          <a:xfrm>
+            <a:off x="4222128" y="2808941"/>
+            <a:ext cx="0" cy="537882"/>
+          </a:xfrm>
+          <a:prstGeom prst="line">
+            <a:avLst/>
+          </a:prstGeom>
+        </p:spPr>
+        <p:style>
+          <a:lnRef idx="2">
+            <a:schemeClr val="accent1"/>
+          </a:lnRef>
+          <a:fillRef idx="0">
+            <a:schemeClr val="accent1"/>
+          </a:fillRef>
+          <a:effectRef idx="1">
+            <a:schemeClr val="accent1"/>
+          </a:effectRef>
+          <a:fontRef idx="minor">
+            <a:schemeClr val="tx1"/>
+          </a:fontRef>
+        </p:style>
+      </p:cxnSp>
+      <p:pic>
+        <p:nvPicPr>
+          <p:cNvPr id="36" name="Image 35">
+            <a:extLst>
+              <a:ext uri="{FF2B5EF4-FFF2-40B4-BE49-F238E27FC236}">
+                <a16:creationId xmlns:a16="http://schemas.microsoft.com/office/drawing/2014/main" id="{C0E88518-4FFA-7811-42C6-2A0B4B8CE1FA}"/>
+              </a:ext>
+            </a:extLst>
+          </p:cNvPr>
+          <p:cNvPicPr>
+            <a:picLocks noChangeAspect="1"/>
+          </p:cNvPicPr>
+          <p:nvPr/>
+        </p:nvPicPr>
+        <p:blipFill>
+          <a:blip r:embed="rId9"/>
+          <a:stretch>
+            <a:fillRect/>
+          </a:stretch>
+        </p:blipFill>
+        <p:spPr>
+          <a:xfrm>
+            <a:off x="6522721" y="5404457"/>
+            <a:ext cx="613774" cy="626174"/>
+          </a:xfrm>
+          <a:prstGeom prst="rect">
+            <a:avLst/>
+          </a:prstGeom>
+        </p:spPr>
+      </p:pic>
+      <p:sp>
+        <p:nvSpPr>
+          <p:cNvPr id="39" name="ZoneTexte 38">
+            <a:extLst>
+              <a:ext uri="{FF2B5EF4-FFF2-40B4-BE49-F238E27FC236}">
+                <a16:creationId xmlns:a16="http://schemas.microsoft.com/office/drawing/2014/main" id="{AA657646-6134-7516-6765-A95D84029C18}"/>
+              </a:ext>
+            </a:extLst>
+          </p:cNvPr>
+          <p:cNvSpPr txBox="1"/>
+          <p:nvPr/>
+        </p:nvSpPr>
+        <p:spPr>
+          <a:xfrm>
+            <a:off x="9131352" y="3572169"/>
+            <a:ext cx="1048685" cy="338554"/>
+          </a:xfrm>
+          <a:prstGeom prst="rect">
+            <a:avLst/>
+          </a:prstGeom>
+          <a:noFill/>
+        </p:spPr>
+        <p:txBody>
+          <a:bodyPr wrap="none" rtlCol="0">
+            <a:spAutoFit/>
+          </a:bodyPr>
+          <a:lstStyle/>
+          <a:p>
+            <a:r>
+              <a:rPr lang="fr-FR" sz="1600" dirty="0">
+                <a:latin typeface="Courier New" panose="02070309020205020404" pitchFamily="49" charset="0"/>
+                <a:cs typeface="Courier New" panose="02070309020205020404" pitchFamily="49" charset="0"/>
+              </a:rPr>
+              <a:t>Topic 1</a:t>
+            </a:r>
+          </a:p>
+        </p:txBody>
+      </p:sp>
+      <p:sp>
+        <p:nvSpPr>
+          <p:cNvPr id="40" name="ZoneTexte 39">
+            <a:extLst>
+              <a:ext uri="{FF2B5EF4-FFF2-40B4-BE49-F238E27FC236}">
+                <a16:creationId xmlns:a16="http://schemas.microsoft.com/office/drawing/2014/main" id="{6E18830C-A06B-2E59-3155-E21C8F882574}"/>
+              </a:ext>
+            </a:extLst>
+          </p:cNvPr>
+          <p:cNvSpPr txBox="1"/>
+          <p:nvPr/>
+        </p:nvSpPr>
+        <p:spPr>
+          <a:xfrm>
+            <a:off x="4421585" y="3598768"/>
+            <a:ext cx="1048685" cy="338554"/>
+          </a:xfrm>
+          <a:prstGeom prst="rect">
+            <a:avLst/>
+          </a:prstGeom>
+          <a:noFill/>
+        </p:spPr>
+        <p:txBody>
+          <a:bodyPr wrap="none" rtlCol="0">
+            <a:spAutoFit/>
+          </a:bodyPr>
+          <a:lstStyle/>
+          <a:p>
+            <a:r>
+              <a:rPr lang="fr-FR" sz="1600" dirty="0">
+                <a:latin typeface="Courier New" panose="02070309020205020404" pitchFamily="49" charset="0"/>
+                <a:cs typeface="Courier New" panose="02070309020205020404" pitchFamily="49" charset="0"/>
+              </a:rPr>
+              <a:t>Topic 2</a:t>
+            </a:r>
+          </a:p>
+        </p:txBody>
+      </p:sp>
+      <p:sp>
+        <p:nvSpPr>
+          <p:cNvPr id="41" name="ZoneTexte 40">
+            <a:extLst>
+              <a:ext uri="{FF2B5EF4-FFF2-40B4-BE49-F238E27FC236}">
+                <a16:creationId xmlns:a16="http://schemas.microsoft.com/office/drawing/2014/main" id="{5F1CCAD6-FC64-5830-AAF7-564B7C6A54BC}"/>
+              </a:ext>
+            </a:extLst>
+          </p:cNvPr>
+          <p:cNvSpPr txBox="1"/>
+          <p:nvPr/>
+        </p:nvSpPr>
+        <p:spPr>
+          <a:xfrm>
+            <a:off x="8856403" y="2816652"/>
+            <a:ext cx="1858201" cy="276999"/>
+          </a:xfrm>
+          <a:prstGeom prst="rect">
+            <a:avLst/>
+          </a:prstGeom>
+          <a:noFill/>
+        </p:spPr>
+        <p:txBody>
+          <a:bodyPr wrap="none" rtlCol="0">
+            <a:spAutoFit/>
+          </a:bodyPr>
+          <a:lstStyle/>
+          <a:p>
+            <a:r>
+              <a:rPr lang="fr-FR" sz="1200" dirty="0" err="1">
+                <a:latin typeface="Courier New" panose="02070309020205020404" pitchFamily="49" charset="0"/>
+                <a:cs typeface="Courier New" panose="02070309020205020404" pitchFamily="49" charset="0"/>
+              </a:rPr>
+              <a:t>subcribe</a:t>
+            </a:r>
+            <a:r>
+              <a:rPr lang="fr-FR" sz="1200" dirty="0">
+                <a:latin typeface="Courier New" panose="02070309020205020404" pitchFamily="49" charset="0"/>
+                <a:cs typeface="Courier New" panose="02070309020205020404" pitchFamily="49" charset="0"/>
+              </a:rPr>
+              <a:t> - speed 1</a:t>
+            </a:r>
+          </a:p>
+        </p:txBody>
+      </p:sp>
+      <p:sp>
+        <p:nvSpPr>
+          <p:cNvPr id="42" name="ZoneTexte 41">
+            <a:extLst>
+              <a:ext uri="{FF2B5EF4-FFF2-40B4-BE49-F238E27FC236}">
+                <a16:creationId xmlns:a16="http://schemas.microsoft.com/office/drawing/2014/main" id="{5C360675-8566-28CD-6662-E5FDD6B6C8C3}"/>
+              </a:ext>
+            </a:extLst>
+          </p:cNvPr>
+          <p:cNvSpPr txBox="1"/>
+          <p:nvPr/>
+        </p:nvSpPr>
+        <p:spPr>
+          <a:xfrm>
+            <a:off x="4405813" y="1947340"/>
+            <a:ext cx="2787943" cy="276999"/>
+          </a:xfrm>
+          <a:prstGeom prst="rect">
+            <a:avLst/>
+          </a:prstGeom>
+          <a:noFill/>
+        </p:spPr>
+        <p:txBody>
+          <a:bodyPr wrap="none" rtlCol="0">
+            <a:spAutoFit/>
+          </a:bodyPr>
+          <a:lstStyle/>
+          <a:p>
+            <a:r>
+              <a:rPr lang="fr-FR" sz="1200" dirty="0" err="1">
+                <a:latin typeface="Courier New" panose="02070309020205020404" pitchFamily="49" charset="0"/>
+                <a:cs typeface="Courier New" panose="02070309020205020404" pitchFamily="49" charset="0"/>
+              </a:rPr>
+              <a:t>request</a:t>
+            </a:r>
+            <a:r>
+              <a:rPr lang="fr-FR" sz="1200" dirty="0">
+                <a:latin typeface="Courier New" panose="02070309020205020404" pitchFamily="49" charset="0"/>
+                <a:cs typeface="Courier New" panose="02070309020205020404" pitchFamily="49" charset="0"/>
+              </a:rPr>
+              <a:t> </a:t>
+            </a:r>
+            <a:r>
+              <a:rPr lang="fr-FR" sz="1200" dirty="0" err="1">
+                <a:latin typeface="Courier New" panose="02070309020205020404" pitchFamily="49" charset="0"/>
+                <a:cs typeface="Courier New" panose="02070309020205020404" pitchFamily="49" charset="0"/>
+              </a:rPr>
+              <a:t>prediction</a:t>
+            </a:r>
+            <a:r>
+              <a:rPr lang="fr-FR" sz="1200" dirty="0">
+                <a:latin typeface="Courier New" panose="02070309020205020404" pitchFamily="49" charset="0"/>
+                <a:cs typeface="Courier New" panose="02070309020205020404" pitchFamily="49" charset="0"/>
+              </a:rPr>
+              <a:t> - speed 2</a:t>
+            </a:r>
+          </a:p>
+        </p:txBody>
+      </p:sp>
+      <p:sp>
+        <p:nvSpPr>
+          <p:cNvPr id="43" name="ZoneTexte 42">
+            <a:extLst>
+              <a:ext uri="{FF2B5EF4-FFF2-40B4-BE49-F238E27FC236}">
+                <a16:creationId xmlns:a16="http://schemas.microsoft.com/office/drawing/2014/main" id="{329BDCA3-BF29-61A6-09FA-C58EA1D22BB1}"/>
+              </a:ext>
+            </a:extLst>
+          </p:cNvPr>
+          <p:cNvSpPr txBox="1"/>
+          <p:nvPr/>
+        </p:nvSpPr>
+        <p:spPr>
+          <a:xfrm>
+            <a:off x="5250331" y="2568723"/>
+            <a:ext cx="1579278" cy="276999"/>
+          </a:xfrm>
+          <a:prstGeom prst="rect">
+            <a:avLst/>
+          </a:prstGeom>
+          <a:noFill/>
+        </p:spPr>
+        <p:txBody>
+          <a:bodyPr wrap="none" rtlCol="0">
+            <a:spAutoFit/>
+          </a:bodyPr>
+          <a:lstStyle/>
+          <a:p>
+            <a:r>
+              <a:rPr lang="fr-FR" sz="1200" dirty="0">
+                <a:latin typeface="Courier New" panose="02070309020205020404" pitchFamily="49" charset="0"/>
+                <a:cs typeface="Courier New" panose="02070309020205020404" pitchFamily="49" charset="0"/>
+              </a:rPr>
+              <a:t>store - speed 3</a:t>
+            </a:r>
+          </a:p>
+        </p:txBody>
+      </p:sp>
+      <p:sp>
+        <p:nvSpPr>
+          <p:cNvPr id="44" name="ZoneTexte 43">
+            <a:extLst>
+              <a:ext uri="{FF2B5EF4-FFF2-40B4-BE49-F238E27FC236}">
+                <a16:creationId xmlns:a16="http://schemas.microsoft.com/office/drawing/2014/main" id="{FD1DC89B-83F3-EB3F-59DB-781D1932EDB9}"/>
+              </a:ext>
+            </a:extLst>
+          </p:cNvPr>
+          <p:cNvSpPr txBox="1"/>
+          <p:nvPr/>
+        </p:nvSpPr>
+        <p:spPr>
+          <a:xfrm>
+            <a:off x="1558733" y="2568723"/>
+            <a:ext cx="2416046" cy="276999"/>
+          </a:xfrm>
+          <a:prstGeom prst="rect">
+            <a:avLst/>
+          </a:prstGeom>
+          <a:noFill/>
+        </p:spPr>
+        <p:txBody>
+          <a:bodyPr wrap="none" rtlCol="0">
+            <a:spAutoFit/>
+          </a:bodyPr>
+          <a:lstStyle/>
+          <a:p>
+            <a:r>
+              <a:rPr lang="fr-FR" sz="1200" dirty="0">
+                <a:latin typeface="Courier New" panose="02070309020205020404" pitchFamily="49" charset="0"/>
+                <a:cs typeface="Courier New" panose="02070309020205020404" pitchFamily="49" charset="0"/>
+              </a:rPr>
+              <a:t>get </a:t>
+            </a:r>
+            <a:r>
+              <a:rPr lang="fr-FR" sz="1200" dirty="0" err="1">
+                <a:latin typeface="Courier New" panose="02070309020205020404" pitchFamily="49" charset="0"/>
+                <a:cs typeface="Courier New" panose="02070309020205020404" pitchFamily="49" charset="0"/>
+              </a:rPr>
+              <a:t>prediction</a:t>
+            </a:r>
+            <a:r>
+              <a:rPr lang="fr-FR" sz="1200" dirty="0">
+                <a:latin typeface="Courier New" panose="02070309020205020404" pitchFamily="49" charset="0"/>
+                <a:cs typeface="Courier New" panose="02070309020205020404" pitchFamily="49" charset="0"/>
+              </a:rPr>
+              <a:t> - speed 2</a:t>
+            </a:r>
+          </a:p>
+        </p:txBody>
+      </p:sp>
+    </p:spTree>
+    <p:extLst>
+      <p:ext uri="{BB962C8B-B14F-4D97-AF65-F5344CB8AC3E}">
+        <p14:creationId xmlns:p14="http://schemas.microsoft.com/office/powerpoint/2010/main" val="655326077"/>
       </p:ext>
     </p:extLst>
   </p:cSld>

</xml_diff>

<commit_message>
carte pour EDA, slides, revues de code et README
</commit_message>
<xml_diff>
--- a/assets/drawings.pptx
+++ b/assets/drawings.pptx
@@ -6,7 +6,8 @@
   </p:sldMasterIdLst>
   <p:sldIdLst>
     <p:sldId id="256" r:id="rId2"/>
-    <p:sldId id="258" r:id="rId3"/>
+    <p:sldId id="259" r:id="rId3"/>
+    <p:sldId id="258" r:id="rId4"/>
   </p:sldIdLst>
   <p:sldSz cx="12192000" cy="6858000"/>
   <p:notesSz cx="6858000" cy="9144000"/>
@@ -116,7 +117,7 @@
 <file path=ppt/revisionInfo.xml><?xml version="1.0" encoding="utf-8"?>
 <p1510:revInfo xmlns:a="http://schemas.openxmlformats.org/drawingml/2006/main" xmlns:r="http://schemas.openxmlformats.org/officeDocument/2006/relationships" xmlns:p1510="http://schemas.microsoft.com/office/powerpoint/2015/10/main">
   <p1510:revLst>
-    <p1510:client id="{F5C91CF1-42F3-4479-8BD4-0F30F72FB431}" v="11" dt="2024-07-04T22:32:34.527"/>
+    <p1510:client id="{F5C91CF1-42F3-4479-8BD4-0F30F72FB431}" v="12" dt="2024-07-11T12:58:02.604"/>
   </p1510:revLst>
 </p1510:revInfo>
 </file>
@@ -126,7 +127,7 @@
   <pc:docChgLst>
     <pc:chgData name="Philippe Baucour" userId="5102170ae7533958" providerId="LiveId" clId="{F5C91CF1-42F3-4479-8BD4-0F30F72FB431}"/>
     <pc:docChg chg="custSel addSld delSld modSld">
-      <pc:chgData name="Philippe Baucour" userId="5102170ae7533958" providerId="LiveId" clId="{F5C91CF1-42F3-4479-8BD4-0F30F72FB431}" dt="2024-07-04T22:33:52.009" v="293" actId="1036"/>
+      <pc:chgData name="Philippe Baucour" userId="5102170ae7533958" providerId="LiveId" clId="{F5C91CF1-42F3-4479-8BD4-0F30F72FB431}" dt="2024-07-11T12:58:12.564" v="296" actId="478"/>
       <pc:docMkLst>
         <pc:docMk/>
       </pc:docMkLst>
@@ -344,6 +345,29 @@
           </ac:cxnSpMkLst>
         </pc:cxnChg>
       </pc:sldChg>
+      <pc:sldChg chg="delSp add mod">
+        <pc:chgData name="Philippe Baucour" userId="5102170ae7533958" providerId="LiveId" clId="{F5C91CF1-42F3-4479-8BD4-0F30F72FB431}" dt="2024-07-11T12:58:12.564" v="296" actId="478"/>
+        <pc:sldMkLst>
+          <pc:docMk/>
+          <pc:sldMk cId="4209746022" sldId="259"/>
+        </pc:sldMkLst>
+        <pc:spChg chg="del">
+          <ac:chgData name="Philippe Baucour" userId="5102170ae7533958" providerId="LiveId" clId="{F5C91CF1-42F3-4479-8BD4-0F30F72FB431}" dt="2024-07-11T12:58:12.564" v="296" actId="478"/>
+          <ac:spMkLst>
+            <pc:docMk/>
+            <pc:sldMk cId="4209746022" sldId="259"/>
+            <ac:spMk id="6" creationId="{54697E4E-4384-381B-732B-757733F07676}"/>
+          </ac:spMkLst>
+        </pc:spChg>
+        <pc:spChg chg="del">
+          <ac:chgData name="Philippe Baucour" userId="5102170ae7533958" providerId="LiveId" clId="{F5C91CF1-42F3-4479-8BD4-0F30F72FB431}" dt="2024-07-11T12:58:08.443" v="295" actId="478"/>
+          <ac:spMkLst>
+            <pc:docMk/>
+            <pc:sldMk cId="4209746022" sldId="259"/>
+            <ac:spMk id="7" creationId="{6F90689E-09A3-6D15-1140-A1CCC30D506D}"/>
+          </ac:spMkLst>
+        </pc:spChg>
+      </pc:sldChg>
     </pc:docChg>
   </pc:docChgLst>
 </pc:chgInfo>
@@ -496,7 +520,7 @@
           <a:p>
             <a:fld id="{48780376-FC85-460A-8725-EC72919AD33D}" type="datetimeFigureOut">
               <a:rPr lang="fr-FR" smtClean="0"/>
-              <a:t>05/07/2024</a:t>
+              <a:t>11/07/2024</a:t>
             </a:fld>
             <a:endParaRPr lang="fr-FR"/>
           </a:p>
@@ -694,7 +718,7 @@
           <a:p>
             <a:fld id="{48780376-FC85-460A-8725-EC72919AD33D}" type="datetimeFigureOut">
               <a:rPr lang="fr-FR" smtClean="0"/>
-              <a:t>05/07/2024</a:t>
+              <a:t>11/07/2024</a:t>
             </a:fld>
             <a:endParaRPr lang="fr-FR"/>
           </a:p>
@@ -902,7 +926,7 @@
           <a:p>
             <a:fld id="{48780376-FC85-460A-8725-EC72919AD33D}" type="datetimeFigureOut">
               <a:rPr lang="fr-FR" smtClean="0"/>
-              <a:t>05/07/2024</a:t>
+              <a:t>11/07/2024</a:t>
             </a:fld>
             <a:endParaRPr lang="fr-FR"/>
           </a:p>
@@ -1100,7 +1124,7 @@
           <a:p>
             <a:fld id="{48780376-FC85-460A-8725-EC72919AD33D}" type="datetimeFigureOut">
               <a:rPr lang="fr-FR" smtClean="0"/>
-              <a:t>05/07/2024</a:t>
+              <a:t>11/07/2024</a:t>
             </a:fld>
             <a:endParaRPr lang="fr-FR"/>
           </a:p>
@@ -1375,7 +1399,7 @@
           <a:p>
             <a:fld id="{48780376-FC85-460A-8725-EC72919AD33D}" type="datetimeFigureOut">
               <a:rPr lang="fr-FR" smtClean="0"/>
-              <a:t>05/07/2024</a:t>
+              <a:t>11/07/2024</a:t>
             </a:fld>
             <a:endParaRPr lang="fr-FR"/>
           </a:p>
@@ -1640,7 +1664,7 @@
           <a:p>
             <a:fld id="{48780376-FC85-460A-8725-EC72919AD33D}" type="datetimeFigureOut">
               <a:rPr lang="fr-FR" smtClean="0"/>
-              <a:t>05/07/2024</a:t>
+              <a:t>11/07/2024</a:t>
             </a:fld>
             <a:endParaRPr lang="fr-FR"/>
           </a:p>
@@ -2052,7 +2076,7 @@
           <a:p>
             <a:fld id="{48780376-FC85-460A-8725-EC72919AD33D}" type="datetimeFigureOut">
               <a:rPr lang="fr-FR" smtClean="0"/>
-              <a:t>05/07/2024</a:t>
+              <a:t>11/07/2024</a:t>
             </a:fld>
             <a:endParaRPr lang="fr-FR"/>
           </a:p>
@@ -2193,7 +2217,7 @@
           <a:p>
             <a:fld id="{48780376-FC85-460A-8725-EC72919AD33D}" type="datetimeFigureOut">
               <a:rPr lang="fr-FR" smtClean="0"/>
-              <a:t>05/07/2024</a:t>
+              <a:t>11/07/2024</a:t>
             </a:fld>
             <a:endParaRPr lang="fr-FR"/>
           </a:p>
@@ -2306,7 +2330,7 @@
           <a:p>
             <a:fld id="{48780376-FC85-460A-8725-EC72919AD33D}" type="datetimeFigureOut">
               <a:rPr lang="fr-FR" smtClean="0"/>
-              <a:t>05/07/2024</a:t>
+              <a:t>11/07/2024</a:t>
             </a:fld>
             <a:endParaRPr lang="fr-FR"/>
           </a:p>
@@ -2617,7 +2641,7 @@
           <a:p>
             <a:fld id="{48780376-FC85-460A-8725-EC72919AD33D}" type="datetimeFigureOut">
               <a:rPr lang="fr-FR" smtClean="0"/>
-              <a:t>05/07/2024</a:t>
+              <a:t>11/07/2024</a:t>
             </a:fld>
             <a:endParaRPr lang="fr-FR"/>
           </a:p>
@@ -2905,7 +2929,7 @@
           <a:p>
             <a:fld id="{48780376-FC85-460A-8725-EC72919AD33D}" type="datetimeFigureOut">
               <a:rPr lang="fr-FR" smtClean="0"/>
-              <a:t>05/07/2024</a:t>
+              <a:t>11/07/2024</a:t>
             </a:fld>
             <a:endParaRPr lang="fr-FR"/>
           </a:p>
@@ -3146,7 +3170,7 @@
           <a:p>
             <a:fld id="{48780376-FC85-460A-8725-EC72919AD33D}" type="datetimeFigureOut">
               <a:rPr lang="fr-FR" smtClean="0"/>
-              <a:t>05/07/2024</a:t>
+              <a:t>11/07/2024</a:t>
             </a:fld>
             <a:endParaRPr lang="fr-FR"/>
           </a:p>
@@ -3862,6 +3886,196 @@
 </file>
 
 <file path=ppt/slides/slide2.xml><?xml version="1.0" encoding="utf-8"?>
+<p:sld xmlns:a="http://schemas.openxmlformats.org/drawingml/2006/main" xmlns:r="http://schemas.openxmlformats.org/officeDocument/2006/relationships" xmlns:p="http://schemas.openxmlformats.org/presentationml/2006/main">
+  <p:cSld>
+    <p:spTree>
+      <p:nvGrpSpPr>
+        <p:cNvPr id="1" name=""/>
+        <p:cNvGrpSpPr/>
+        <p:nvPr/>
+      </p:nvGrpSpPr>
+      <p:grpSpPr>
+        <a:xfrm>
+          <a:off x="0" y="0"/>
+          <a:ext cx="0" cy="0"/>
+          <a:chOff x="0" y="0"/>
+          <a:chExt cx="0" cy="0"/>
+        </a:xfrm>
+      </p:grpSpPr>
+      <p:sp>
+        <p:nvSpPr>
+          <p:cNvPr id="2" name="Titre 1">
+            <a:extLst>
+              <a:ext uri="{FF2B5EF4-FFF2-40B4-BE49-F238E27FC236}">
+                <a16:creationId xmlns:a16="http://schemas.microsoft.com/office/drawing/2014/main" id="{F87521B0-A357-0FB7-95F6-D86E965CB4E4}"/>
+              </a:ext>
+            </a:extLst>
+          </p:cNvPr>
+          <p:cNvSpPr>
+            <a:spLocks noGrp="1"/>
+          </p:cNvSpPr>
+          <p:nvPr>
+            <p:ph type="ctrTitle"/>
+          </p:nvPr>
+        </p:nvSpPr>
+        <p:spPr/>
+        <p:txBody>
+          <a:bodyPr/>
+          <a:lstStyle/>
+          <a:p>
+            <a:endParaRPr lang="fr-FR"/>
+          </a:p>
+        </p:txBody>
+      </p:sp>
+      <p:sp>
+        <p:nvSpPr>
+          <p:cNvPr id="3" name="Sous-titre 2">
+            <a:extLst>
+              <a:ext uri="{FF2B5EF4-FFF2-40B4-BE49-F238E27FC236}">
+                <a16:creationId xmlns:a16="http://schemas.microsoft.com/office/drawing/2014/main" id="{DAF7FD93-FEB4-7498-A34D-09ECE8140F2D}"/>
+              </a:ext>
+            </a:extLst>
+          </p:cNvPr>
+          <p:cNvSpPr>
+            <a:spLocks noGrp="1"/>
+          </p:cNvSpPr>
+          <p:nvPr>
+            <p:ph type="subTitle" idx="1"/>
+          </p:nvPr>
+        </p:nvSpPr>
+        <p:spPr/>
+        <p:txBody>
+          <a:bodyPr/>
+          <a:lstStyle/>
+          <a:p>
+            <a:endParaRPr lang="fr-FR"/>
+          </a:p>
+        </p:txBody>
+      </p:sp>
+      <p:pic>
+        <p:nvPicPr>
+          <p:cNvPr id="5" name="Image 4" descr="Une image contenant texte, capture d’écran, Police, diagramme">
+            <a:extLst>
+              <a:ext uri="{FF2B5EF4-FFF2-40B4-BE49-F238E27FC236}">
+                <a16:creationId xmlns:a16="http://schemas.microsoft.com/office/drawing/2014/main" id="{2A6F49D9-1E09-1A1E-D7D5-D110200FFA72}"/>
+              </a:ext>
+            </a:extLst>
+          </p:cNvPr>
+          <p:cNvPicPr>
+            <a:picLocks noChangeAspect="1"/>
+          </p:cNvPicPr>
+          <p:nvPr/>
+        </p:nvPicPr>
+        <p:blipFill>
+          <a:blip r:embed="rId2">
+            <a:extLst>
+              <a:ext uri="{28A0092B-C50C-407E-A947-70E740481C1C}">
+                <a14:useLocalDpi xmlns:a14="http://schemas.microsoft.com/office/drawing/2010/main" val="0"/>
+              </a:ext>
+            </a:extLst>
+          </a:blip>
+          <a:stretch>
+            <a:fillRect/>
+          </a:stretch>
+        </p:blipFill>
+        <p:spPr>
+          <a:xfrm>
+            <a:off x="870160" y="0"/>
+            <a:ext cx="10451679" cy="6858000"/>
+          </a:xfrm>
+          <a:prstGeom prst="rect">
+            <a:avLst/>
+          </a:prstGeom>
+        </p:spPr>
+      </p:pic>
+      <p:pic>
+        <p:nvPicPr>
+          <p:cNvPr id="9" name="Image 8">
+            <a:extLst>
+              <a:ext uri="{FF2B5EF4-FFF2-40B4-BE49-F238E27FC236}">
+                <a16:creationId xmlns:a16="http://schemas.microsoft.com/office/drawing/2014/main" id="{87F98B8D-5314-7388-2591-78BB58BC0882}"/>
+              </a:ext>
+            </a:extLst>
+          </p:cNvPr>
+          <p:cNvPicPr>
+            <a:picLocks noChangeAspect="1"/>
+          </p:cNvPicPr>
+          <p:nvPr/>
+        </p:nvPicPr>
+        <p:blipFill>
+          <a:blip r:embed="rId3"/>
+          <a:stretch>
+            <a:fillRect/>
+          </a:stretch>
+        </p:blipFill>
+        <p:spPr>
+          <a:xfrm>
+            <a:off x="2449146" y="2963653"/>
+            <a:ext cx="376537" cy="424473"/>
+          </a:xfrm>
+          <a:prstGeom prst="rect">
+            <a:avLst/>
+          </a:prstGeom>
+        </p:spPr>
+      </p:pic>
+      <p:cxnSp>
+        <p:nvCxnSpPr>
+          <p:cNvPr id="11" name="Connecteur droit avec flèche 10">
+            <a:extLst>
+              <a:ext uri="{FF2B5EF4-FFF2-40B4-BE49-F238E27FC236}">
+                <a16:creationId xmlns:a16="http://schemas.microsoft.com/office/drawing/2014/main" id="{1DADCA81-D17F-7055-3D74-6CA04EDD1133}"/>
+              </a:ext>
+            </a:extLst>
+          </p:cNvPr>
+          <p:cNvCxnSpPr>
+            <a:cxnSpLocks/>
+          </p:cNvCxnSpPr>
+          <p:nvPr/>
+        </p:nvCxnSpPr>
+        <p:spPr>
+          <a:xfrm flipV="1">
+            <a:off x="2630659" y="1735168"/>
+            <a:ext cx="0" cy="1197946"/>
+          </a:xfrm>
+          <a:prstGeom prst="straightConnector1">
+            <a:avLst/>
+          </a:prstGeom>
+          <a:ln w="9525">
+            <a:solidFill>
+              <a:schemeClr val="tx1"/>
+            </a:solidFill>
+            <a:tailEnd type="triangle"/>
+          </a:ln>
+        </p:spPr>
+        <p:style>
+          <a:lnRef idx="2">
+            <a:schemeClr val="accent1"/>
+          </a:lnRef>
+          <a:fillRef idx="0">
+            <a:schemeClr val="accent1"/>
+          </a:fillRef>
+          <a:effectRef idx="1">
+            <a:schemeClr val="accent1"/>
+          </a:effectRef>
+          <a:fontRef idx="minor">
+            <a:schemeClr val="tx1"/>
+          </a:fontRef>
+        </p:style>
+      </p:cxnSp>
+    </p:spTree>
+    <p:extLst>
+      <p:ext uri="{BB962C8B-B14F-4D97-AF65-F5344CB8AC3E}">
+        <p14:creationId xmlns:p14="http://schemas.microsoft.com/office/powerpoint/2010/main" val="4209746022"/>
+      </p:ext>
+    </p:extLst>
+  </p:cSld>
+  <p:clrMapOvr>
+    <a:masterClrMapping/>
+  </p:clrMapOvr>
+</p:sld>
+</file>
+
+<file path=ppt/slides/slide3.xml><?xml version="1.0" encoding="utf-8"?>
 <p:sld xmlns:a="http://schemas.openxmlformats.org/drawingml/2006/main" xmlns:r="http://schemas.openxmlformats.org/officeDocument/2006/relationships" xmlns:p="http://schemas.openxmlformats.org/presentationml/2006/main">
   <p:cSld>
     <p:spTree>

</xml_diff>